<commit_message>
add new tip for Protege: merge ontology
</commit_message>
<xml_diff>
--- a/daily-learning.pptx
+++ b/daily-learning.pptx
@@ -5,13 +5,16 @@
     <p:sldMasterId id="2147483660" r:id="rId1"/>
   </p:sldMasterIdLst>
   <p:notesMasterIdLst>
-    <p:notesMasterId r:id="rId3"/>
+    <p:notesMasterId r:id="rId6"/>
   </p:notesMasterIdLst>
   <p:handoutMasterIdLst>
-    <p:handoutMasterId r:id="rId4"/>
+    <p:handoutMasterId r:id="rId7"/>
   </p:handoutMasterIdLst>
   <p:sldIdLst>
     <p:sldId id="256" r:id="rId2"/>
+    <p:sldId id="259" r:id="rId3"/>
+    <p:sldId id="257" r:id="rId4"/>
+    <p:sldId id="258" r:id="rId5"/>
   </p:sldIdLst>
   <p:sldSz cx="12192000" cy="6858000"/>
   <p:notesSz cx="6858000" cy="9144000"/>
@@ -215,7 +218,7 @@
           <a:p>
             <a:fld id="{C1866161-D383-45DC-9645-1D21647A8641}" type="datetimeFigureOut">
               <a:rPr lang="en-US" smtClean="0"/>
-              <a:t>11/23/2023</a:t>
+              <a:t>11/24/2023</a:t>
             </a:fld>
             <a:endParaRPr lang="en-US" dirty="0"/>
           </a:p>
@@ -392,7 +395,7 @@
           <a:p>
             <a:fld id="{733789D0-CA34-4934-A369-C3113E12A3EF}" type="datetimeFigureOut">
               <a:rPr lang="en-US" smtClean="0"/>
-              <a:t>11/23/2023</a:t>
+              <a:t>11/24/2023</a:t>
             </a:fld>
             <a:endParaRPr lang="en-US" dirty="0"/>
           </a:p>
@@ -1026,7 +1029,7 @@
           <a:p>
             <a:fld id="{616D6166-2B42-4F11-BAA6-8ABAE1BE810C}" type="datetimeFigureOut">
               <a:rPr lang="en-US" noProof="0" smtClean="0"/>
-              <a:t>11/23/2023</a:t>
+              <a:t>11/24/2023</a:t>
             </a:fld>
             <a:endParaRPr lang="en-US" noProof="0" dirty="0"/>
           </a:p>
@@ -1485,7 +1488,7 @@
           <a:p>
             <a:fld id="{616D6166-2B42-4F11-BAA6-8ABAE1BE810C}" type="datetimeFigureOut">
               <a:rPr lang="en-US" noProof="0" smtClean="0"/>
-              <a:t>11/23/2023</a:t>
+              <a:t>11/24/2023</a:t>
             </a:fld>
             <a:endParaRPr lang="en-US" noProof="0" dirty="0"/>
           </a:p>
@@ -2039,7 +2042,7 @@
           <a:p>
             <a:fld id="{616D6166-2B42-4F11-BAA6-8ABAE1BE810C}" type="datetimeFigureOut">
               <a:rPr lang="en-US" noProof="0" smtClean="0"/>
-              <a:t>11/23/2023</a:t>
+              <a:t>11/24/2023</a:t>
             </a:fld>
             <a:endParaRPr lang="en-US" noProof="0" dirty="0"/>
           </a:p>
@@ -2547,7 +2550,7 @@
           <a:p>
             <a:fld id="{616D6166-2B42-4F11-BAA6-8ABAE1BE810C}" type="datetimeFigureOut">
               <a:rPr lang="en-US" noProof="0" smtClean="0"/>
-              <a:t>11/23/2023</a:t>
+              <a:t>11/24/2023</a:t>
             </a:fld>
             <a:endParaRPr lang="en-US" noProof="0" dirty="0"/>
           </a:p>
@@ -2898,7 +2901,7 @@
           <a:p>
             <a:fld id="{616D6166-2B42-4F11-BAA6-8ABAE1BE810C}" type="datetimeFigureOut">
               <a:rPr lang="en-US" noProof="0" smtClean="0"/>
-              <a:t>11/23/2023</a:t>
+              <a:t>11/24/2023</a:t>
             </a:fld>
             <a:endParaRPr lang="en-US" noProof="0" dirty="0"/>
           </a:p>
@@ -3490,7 +3493,7 @@
           <a:p>
             <a:fld id="{616D6166-2B42-4F11-BAA6-8ABAE1BE810C}" type="datetimeFigureOut">
               <a:rPr lang="en-US" noProof="0" smtClean="0"/>
-              <a:t>11/23/2023</a:t>
+              <a:t>11/24/2023</a:t>
             </a:fld>
             <a:endParaRPr lang="en-US" noProof="0" dirty="0"/>
           </a:p>
@@ -4078,7 +4081,7 @@
           <a:p>
             <a:fld id="{616D6166-2B42-4F11-BAA6-8ABAE1BE810C}" type="datetimeFigureOut">
               <a:rPr lang="en-US" noProof="0" smtClean="0"/>
-              <a:t>11/23/2023</a:t>
+              <a:t>11/24/2023</a:t>
             </a:fld>
             <a:endParaRPr lang="en-US" noProof="0" dirty="0"/>
           </a:p>
@@ -4850,7 +4853,7 @@
           <a:p>
             <a:fld id="{616D6166-2B42-4F11-BAA6-8ABAE1BE810C}" type="datetimeFigureOut">
               <a:rPr lang="en-US" noProof="0" smtClean="0"/>
-              <a:t>11/23/2023</a:t>
+              <a:t>11/24/2023</a:t>
             </a:fld>
             <a:endParaRPr lang="en-US" noProof="0" dirty="0"/>
           </a:p>
@@ -5719,7 +5722,7 @@
           <a:p>
             <a:fld id="{616D6166-2B42-4F11-BAA6-8ABAE1BE810C}" type="datetimeFigureOut">
               <a:rPr lang="en-US" noProof="0" smtClean="0"/>
-              <a:t>11/23/2023</a:t>
+              <a:t>11/24/2023</a:t>
             </a:fld>
             <a:endParaRPr lang="en-US" noProof="0" dirty="0"/>
           </a:p>
@@ -6188,7 +6191,7 @@
           <a:p>
             <a:fld id="{616D6166-2B42-4F11-BAA6-8ABAE1BE810C}" type="datetimeFigureOut">
               <a:rPr lang="en-US" noProof="0" smtClean="0"/>
-              <a:t>11/23/2023</a:t>
+              <a:t>11/24/2023</a:t>
             </a:fld>
             <a:endParaRPr lang="en-US" noProof="0" dirty="0"/>
           </a:p>
@@ -7774,7 +7777,7 @@
           <a:p>
             <a:fld id="{616D6166-2B42-4F11-BAA6-8ABAE1BE810C}" type="datetimeFigureOut">
               <a:rPr lang="en-US" noProof="0" smtClean="0"/>
-              <a:t>11/23/2023</a:t>
+              <a:t>11/24/2023</a:t>
             </a:fld>
             <a:endParaRPr lang="en-US" noProof="0" dirty="0"/>
           </a:p>
@@ -8292,7 +8295,7 @@
           <a:p>
             <a:fld id="{616D6166-2B42-4F11-BAA6-8ABAE1BE810C}" type="datetimeFigureOut">
               <a:rPr lang="en-US" noProof="0" smtClean="0"/>
-              <a:t>11/23/2023</a:t>
+              <a:t>11/24/2023</a:t>
             </a:fld>
             <a:endParaRPr lang="en-US" noProof="0" dirty="0"/>
           </a:p>
@@ -9137,7 +9140,7 @@
           <a:p>
             <a:fld id="{616D6166-2B42-4F11-BAA6-8ABAE1BE810C}" type="datetimeFigureOut">
               <a:rPr lang="en-US" noProof="0" smtClean="0"/>
-              <a:t>11/23/2023</a:t>
+              <a:t>11/24/2023</a:t>
             </a:fld>
             <a:endParaRPr lang="en-US" noProof="0" dirty="0"/>
           </a:p>
@@ -9694,7 +9697,7 @@
           <a:p>
             <a:fld id="{616D6166-2B42-4F11-BAA6-8ABAE1BE810C}" type="datetimeFigureOut">
               <a:rPr lang="en-US" noProof="0" smtClean="0"/>
-              <a:t>11/23/2023</a:t>
+              <a:t>11/24/2023</a:t>
             </a:fld>
             <a:endParaRPr lang="en-US" noProof="0" dirty="0"/>
           </a:p>
@@ -10288,7 +10291,7 @@
           <a:p>
             <a:fld id="{616D6166-2B42-4F11-BAA6-8ABAE1BE810C}" type="datetimeFigureOut">
               <a:rPr lang="en-US" noProof="0" smtClean="0"/>
-              <a:t>11/23/2023</a:t>
+              <a:t>11/24/2023</a:t>
             </a:fld>
             <a:endParaRPr lang="en-US" noProof="0" dirty="0"/>
           </a:p>
@@ -11024,7 +11027,7 @@
           <a:p>
             <a:fld id="{616D6166-2B42-4F11-BAA6-8ABAE1BE810C}" type="datetimeFigureOut">
               <a:rPr lang="en-US" noProof="0" smtClean="0"/>
-              <a:t>11/23/2023</a:t>
+              <a:t>11/24/2023</a:t>
             </a:fld>
             <a:endParaRPr lang="en-US" noProof="0" dirty="0"/>
           </a:p>
@@ -11490,7 +11493,7 @@
           <a:p>
             <a:fld id="{616D6166-2B42-4F11-BAA6-8ABAE1BE810C}" type="datetimeFigureOut">
               <a:rPr lang="en-US" noProof="0" smtClean="0"/>
-              <a:t>11/23/2023</a:t>
+              <a:t>11/24/2023</a:t>
             </a:fld>
             <a:endParaRPr lang="en-US" noProof="0" dirty="0"/>
           </a:p>
@@ -12041,7 +12044,7 @@
           <a:p>
             <a:fld id="{616D6166-2B42-4F11-BAA6-8ABAE1BE810C}" type="datetimeFigureOut">
               <a:rPr lang="en-US" noProof="0" smtClean="0"/>
-              <a:t>11/23/2023</a:t>
+              <a:t>11/24/2023</a:t>
             </a:fld>
             <a:endParaRPr lang="en-US" noProof="0" dirty="0"/>
           </a:p>
@@ -12520,7 +12523,7 @@
           <a:p>
             <a:fld id="{616D6166-2B42-4F11-BAA6-8ABAE1BE810C}" type="datetimeFigureOut">
               <a:rPr lang="en-US" noProof="0" smtClean="0"/>
-              <a:t>11/23/2023</a:t>
+              <a:t>11/24/2023</a:t>
             </a:fld>
             <a:endParaRPr lang="en-US" noProof="0" dirty="0"/>
           </a:p>
@@ -12806,7 +12809,7 @@
           <a:p>
             <a:fld id="{616D6166-2B42-4F11-BAA6-8ABAE1BE810C}" type="datetimeFigureOut">
               <a:rPr lang="en-US" noProof="0" smtClean="0"/>
-              <a:t>11/23/2023</a:t>
+              <a:t>11/24/2023</a:t>
             </a:fld>
             <a:endParaRPr lang="en-US" noProof="0" dirty="0"/>
           </a:p>
@@ -13466,6 +13469,732 @@
     <p:extLst>
       <p:ext uri="{BB962C8B-B14F-4D97-AF65-F5344CB8AC3E}">
         <p14:creationId xmlns:p14="http://schemas.microsoft.com/office/powerpoint/2010/main" val="1906530976"/>
+      </p:ext>
+    </p:extLst>
+  </p:cSld>
+  <p:clrMapOvr>
+    <a:masterClrMapping/>
+  </p:clrMapOvr>
+</p:sld>
+</file>
+
+<file path=ppt/slides/slide2.xml><?xml version="1.0" encoding="utf-8"?>
+<p:sld xmlns:a="http://schemas.openxmlformats.org/drawingml/2006/main" xmlns:r="http://schemas.openxmlformats.org/officeDocument/2006/relationships" xmlns:p="http://schemas.openxmlformats.org/presentationml/2006/main">
+  <p:cSld>
+    <p:spTree>
+      <p:nvGrpSpPr>
+        <p:cNvPr id="1" name=""/>
+        <p:cNvGrpSpPr/>
+        <p:nvPr/>
+      </p:nvGrpSpPr>
+      <p:grpSpPr>
+        <a:xfrm>
+          <a:off x="0" y="0"/>
+          <a:ext cx="0" cy="0"/>
+          <a:chOff x="0" y="0"/>
+          <a:chExt cx="0" cy="0"/>
+        </a:xfrm>
+      </p:grpSpPr>
+      <p:sp>
+        <p:nvSpPr>
+          <p:cNvPr id="7" name="Title 6">
+            <a:extLst>
+              <a:ext uri="{FF2B5EF4-FFF2-40B4-BE49-F238E27FC236}">
+                <a16:creationId xmlns:a16="http://schemas.microsoft.com/office/drawing/2014/main" id="{0C47DCEC-9ED2-7B24-2FA3-665B73396D57}"/>
+              </a:ext>
+            </a:extLst>
+          </p:cNvPr>
+          <p:cNvSpPr>
+            <a:spLocks noGrp="1"/>
+          </p:cNvSpPr>
+          <p:nvPr>
+            <p:ph type="ctrTitle"/>
+          </p:nvPr>
+        </p:nvSpPr>
+        <p:spPr/>
+        <p:txBody>
+          <a:bodyPr/>
+          <a:lstStyle/>
+          <a:p>
+            <a:r>
+              <a:rPr lang="zh-CN" altLang="en-US" dirty="0"/>
+              <a:t>中国文化与中文学习技巧</a:t>
+            </a:r>
+            <a:endParaRPr lang="en-US" dirty="0"/>
+          </a:p>
+        </p:txBody>
+      </p:sp>
+      <p:sp>
+        <p:nvSpPr>
+          <p:cNvPr id="8" name="Subtitle 7">
+            <a:extLst>
+              <a:ext uri="{FF2B5EF4-FFF2-40B4-BE49-F238E27FC236}">
+                <a16:creationId xmlns:a16="http://schemas.microsoft.com/office/drawing/2014/main" id="{648B65A1-94CE-0B78-E258-69B1254E06EF}"/>
+              </a:ext>
+            </a:extLst>
+          </p:cNvPr>
+          <p:cNvSpPr>
+            <a:spLocks noGrp="1"/>
+          </p:cNvSpPr>
+          <p:nvPr>
+            <p:ph type="subTitle" idx="1"/>
+          </p:nvPr>
+        </p:nvSpPr>
+        <p:spPr/>
+        <p:txBody>
+          <a:bodyPr/>
+          <a:lstStyle/>
+          <a:p>
+            <a:r>
+              <a:rPr lang="en-US" dirty="0"/>
+              <a:t>Xiaoqi Zhao</a:t>
+            </a:r>
+          </a:p>
+        </p:txBody>
+      </p:sp>
+      <p:pic>
+        <p:nvPicPr>
+          <p:cNvPr id="10" name="Picture 9">
+            <a:extLst>
+              <a:ext uri="{FF2B5EF4-FFF2-40B4-BE49-F238E27FC236}">
+                <a16:creationId xmlns:a16="http://schemas.microsoft.com/office/drawing/2014/main" id="{EC0D98A0-B85E-C519-3CCC-2A5B78EE9404}"/>
+              </a:ext>
+            </a:extLst>
+          </p:cNvPr>
+          <p:cNvPicPr>
+            <a:picLocks noChangeAspect="1"/>
+          </p:cNvPicPr>
+          <p:nvPr/>
+        </p:nvPicPr>
+        <p:blipFill>
+          <a:blip r:embed="rId2">
+            <a:clrChange>
+              <a:clrFrom>
+                <a:srgbClr val="FFFFFF"/>
+              </a:clrFrom>
+              <a:clrTo>
+                <a:srgbClr val="FFFFFF">
+                  <a:alpha val="0"/>
+                </a:srgbClr>
+              </a:clrTo>
+            </a:clrChange>
+          </a:blip>
+          <a:stretch>
+            <a:fillRect/>
+          </a:stretch>
+        </p:blipFill>
+        <p:spPr>
+          <a:xfrm>
+            <a:off x="0" y="2596839"/>
+            <a:ext cx="1611984" cy="1692357"/>
+          </a:xfrm>
+          <a:prstGeom prst="rect">
+            <a:avLst/>
+          </a:prstGeom>
+        </p:spPr>
+      </p:pic>
+    </p:spTree>
+    <p:extLst>
+      <p:ext uri="{BB962C8B-B14F-4D97-AF65-F5344CB8AC3E}">
+        <p14:creationId xmlns:p14="http://schemas.microsoft.com/office/powerpoint/2010/main" val="3497237661"/>
+      </p:ext>
+    </p:extLst>
+  </p:cSld>
+  <p:clrMapOvr>
+    <a:masterClrMapping/>
+  </p:clrMapOvr>
+</p:sld>
+</file>
+
+<file path=ppt/slides/slide3.xml><?xml version="1.0" encoding="utf-8"?>
+<p:sld xmlns:a="http://schemas.openxmlformats.org/drawingml/2006/main" xmlns:r="http://schemas.openxmlformats.org/officeDocument/2006/relationships" xmlns:p="http://schemas.openxmlformats.org/presentationml/2006/main">
+  <p:cSld>
+    <p:spTree>
+      <p:nvGrpSpPr>
+        <p:cNvPr id="1" name=""/>
+        <p:cNvGrpSpPr/>
+        <p:nvPr/>
+      </p:nvGrpSpPr>
+      <p:grpSpPr>
+        <a:xfrm>
+          <a:off x="0" y="0"/>
+          <a:ext cx="0" cy="0"/>
+          <a:chOff x="0" y="0"/>
+          <a:chExt cx="0" cy="0"/>
+        </a:xfrm>
+      </p:grpSpPr>
+      <p:sp>
+        <p:nvSpPr>
+          <p:cNvPr id="2" name="Title 1">
+            <a:extLst>
+              <a:ext uri="{FF2B5EF4-FFF2-40B4-BE49-F238E27FC236}">
+                <a16:creationId xmlns:a16="http://schemas.microsoft.com/office/drawing/2014/main" id="{8B98BBFB-4314-436C-A688-96F483D693AB}"/>
+              </a:ext>
+            </a:extLst>
+          </p:cNvPr>
+          <p:cNvSpPr>
+            <a:spLocks noGrp="1"/>
+          </p:cNvSpPr>
+          <p:nvPr>
+            <p:ph type="ctrTitle"/>
+          </p:nvPr>
+        </p:nvSpPr>
+        <p:spPr/>
+        <p:txBody>
+          <a:bodyPr anchor="ctr" anchorCtr="0"/>
+          <a:lstStyle/>
+          <a:p>
+            <a:r>
+              <a:rPr lang="zh-CN" altLang="en-US" dirty="0"/>
+              <a:t>汉语技巧：</a:t>
+            </a:r>
+            <a:r>
+              <a:rPr lang="zh-CN" altLang="en-US" sz="6000" dirty="0"/>
+              <a:t>如何输入拼音</a:t>
+            </a:r>
+            <a:endParaRPr lang="en-US" dirty="0"/>
+          </a:p>
+        </p:txBody>
+      </p:sp>
+      <p:sp>
+        <p:nvSpPr>
+          <p:cNvPr id="3" name="Subtitle 2">
+            <a:extLst>
+              <a:ext uri="{FF2B5EF4-FFF2-40B4-BE49-F238E27FC236}">
+                <a16:creationId xmlns:a16="http://schemas.microsoft.com/office/drawing/2014/main" id="{6AA173D3-8B7E-4F91-B862-AC30CB0D2705}"/>
+              </a:ext>
+            </a:extLst>
+          </p:cNvPr>
+          <p:cNvSpPr>
+            <a:spLocks noGrp="1"/>
+          </p:cNvSpPr>
+          <p:nvPr>
+            <p:ph type="subTitle" idx="1"/>
+          </p:nvPr>
+        </p:nvSpPr>
+        <p:spPr/>
+        <p:txBody>
+          <a:bodyPr>
+            <a:normAutofit/>
+          </a:bodyPr>
+          <a:lstStyle/>
+          <a:p>
+            <a:r>
+              <a:rPr lang="en-US" sz="6000" dirty="0"/>
+              <a:t>How to Input P</a:t>
+            </a:r>
+            <a:r>
+              <a:rPr lang="en-US" altLang="zh-CN" sz="6000" dirty="0"/>
+              <a:t>ī</a:t>
+            </a:r>
+            <a:r>
+              <a:rPr lang="en-US" sz="6000" dirty="0"/>
+              <a:t>nY</a:t>
+            </a:r>
+            <a:r>
+              <a:rPr lang="en-US" altLang="zh-CN" sz="6000" dirty="0"/>
+              <a:t>ī</a:t>
+            </a:r>
+            <a:r>
+              <a:rPr lang="en-US" sz="6000" dirty="0"/>
+              <a:t>n</a:t>
+            </a:r>
+          </a:p>
+        </p:txBody>
+      </p:sp>
+      <p:pic>
+        <p:nvPicPr>
+          <p:cNvPr id="9" name="Graphic 8" descr="Book icon">
+            <a:extLst>
+              <a:ext uri="{FF2B5EF4-FFF2-40B4-BE49-F238E27FC236}">
+                <a16:creationId xmlns:a16="http://schemas.microsoft.com/office/drawing/2014/main" id="{E26792AF-5D39-4A12-8EDD-CC09A60BDA44}"/>
+              </a:ext>
+            </a:extLst>
+          </p:cNvPr>
+          <p:cNvPicPr>
+            <a:picLocks noChangeAspect="1"/>
+          </p:cNvPicPr>
+          <p:nvPr/>
+        </p:nvPicPr>
+        <p:blipFill>
+          <a:blip r:embed="rId2">
+            <a:extLst>
+              <a:ext uri="{28A0092B-C50C-407E-A947-70E740481C1C}">
+                <a14:useLocalDpi xmlns:a14="http://schemas.microsoft.com/office/drawing/2010/main" val="0"/>
+              </a:ext>
+              <a:ext uri="{96DAC541-7B7A-43D3-8B79-37D633B846F1}">
+                <asvg:svgBlip xmlns:asvg="http://schemas.microsoft.com/office/drawing/2016/SVG/main" r:embed="rId3"/>
+              </a:ext>
+            </a:extLst>
+          </a:blip>
+          <a:stretch>
+            <a:fillRect/>
+          </a:stretch>
+        </p:blipFill>
+        <p:spPr>
+          <a:xfrm>
+            <a:off x="344993" y="2961000"/>
+            <a:ext cx="936000" cy="936000"/>
+          </a:xfrm>
+          <a:prstGeom prst="rect">
+            <a:avLst/>
+          </a:prstGeom>
+        </p:spPr>
+      </p:pic>
+      <p:sp>
+        <p:nvSpPr>
+          <p:cNvPr id="4" name="TextBox 3">
+            <a:extLst>
+              <a:ext uri="{FF2B5EF4-FFF2-40B4-BE49-F238E27FC236}">
+                <a16:creationId xmlns:a16="http://schemas.microsoft.com/office/drawing/2014/main" id="{125B2552-F1B2-B9D8-1732-97A0B1DA1273}"/>
+              </a:ext>
+            </a:extLst>
+          </p:cNvPr>
+          <p:cNvSpPr txBox="1"/>
+          <p:nvPr/>
+        </p:nvSpPr>
+        <p:spPr>
+          <a:xfrm>
+            <a:off x="3003176" y="5511726"/>
+            <a:ext cx="6578660" cy="646331"/>
+          </a:xfrm>
+          <a:prstGeom prst="rect">
+            <a:avLst/>
+          </a:prstGeom>
+          <a:noFill/>
+        </p:spPr>
+        <p:txBody>
+          <a:bodyPr wrap="none" rtlCol="0">
+            <a:spAutoFit/>
+          </a:bodyPr>
+          <a:lstStyle/>
+          <a:p>
+            <a:r>
+              <a:rPr lang="zh-CN" altLang="en-US" dirty="0"/>
+              <a:t>知乎帖子：</a:t>
+            </a:r>
+            <a:r>
+              <a:rPr lang="en-US" altLang="zh-CN" dirty="0">
+                <a:hlinkClick r:id="rId4"/>
+              </a:rPr>
+              <a:t>https://zhuanlan.zhihu.com/p/429983255</a:t>
+            </a:r>
+            <a:endParaRPr lang="en-US" altLang="zh-CN" dirty="0"/>
+          </a:p>
+          <a:p>
+            <a:r>
+              <a:rPr lang="zh-CN" altLang="en-US" dirty="0"/>
+              <a:t>汉字转拼音： </a:t>
+            </a:r>
+            <a:r>
+              <a:rPr lang="en-US" altLang="zh-CN" dirty="0">
+                <a:hlinkClick r:id="rId5"/>
+              </a:rPr>
+              <a:t>http://www.hanyupinyin.cn/hanzizhuanpinyin/</a:t>
+            </a:r>
+            <a:endParaRPr lang="en-US" altLang="zh-CN" dirty="0"/>
+          </a:p>
+        </p:txBody>
+      </p:sp>
+      <p:sp>
+        <p:nvSpPr>
+          <p:cNvPr id="5" name="TextBox 4">
+            <a:extLst>
+              <a:ext uri="{FF2B5EF4-FFF2-40B4-BE49-F238E27FC236}">
+                <a16:creationId xmlns:a16="http://schemas.microsoft.com/office/drawing/2014/main" id="{F924BDE4-3D09-06C4-2794-418EDD1F2332}"/>
+              </a:ext>
+            </a:extLst>
+          </p:cNvPr>
+          <p:cNvSpPr txBox="1"/>
+          <p:nvPr/>
+        </p:nvSpPr>
+        <p:spPr>
+          <a:xfrm>
+            <a:off x="10623177" y="6418728"/>
+            <a:ext cx="1385316" cy="369332"/>
+          </a:xfrm>
+          <a:prstGeom prst="rect">
+            <a:avLst/>
+          </a:prstGeom>
+          <a:noFill/>
+        </p:spPr>
+        <p:txBody>
+          <a:bodyPr wrap="none" rtlCol="0">
+            <a:spAutoFit/>
+          </a:bodyPr>
+          <a:lstStyle/>
+          <a:p>
+            <a:r>
+              <a:rPr lang="en-US" altLang="zh-CN" dirty="0"/>
+              <a:t>Xiaoqi Zhao</a:t>
+            </a:r>
+            <a:endParaRPr lang="en-US" dirty="0"/>
+          </a:p>
+        </p:txBody>
+      </p:sp>
+      <p:pic>
+        <p:nvPicPr>
+          <p:cNvPr id="8" name="图片 7">
+            <a:extLst>
+              <a:ext uri="{FF2B5EF4-FFF2-40B4-BE49-F238E27FC236}">
+                <a16:creationId xmlns:a16="http://schemas.microsoft.com/office/drawing/2014/main" id="{C120B3D9-A06A-8D4C-718D-27C81A6F35E8}"/>
+              </a:ext>
+            </a:extLst>
+          </p:cNvPr>
+          <p:cNvPicPr>
+            <a:picLocks noChangeAspect="1"/>
+          </p:cNvPicPr>
+          <p:nvPr/>
+        </p:nvPicPr>
+        <p:blipFill>
+          <a:blip r:embed="rId6"/>
+          <a:stretch>
+            <a:fillRect/>
+          </a:stretch>
+        </p:blipFill>
+        <p:spPr>
+          <a:xfrm>
+            <a:off x="3003176" y="739868"/>
+            <a:ext cx="5457825" cy="1362075"/>
+          </a:xfrm>
+          <a:prstGeom prst="rect">
+            <a:avLst/>
+          </a:prstGeom>
+        </p:spPr>
+      </p:pic>
+    </p:spTree>
+    <p:extLst>
+      <p:ext uri="{BB962C8B-B14F-4D97-AF65-F5344CB8AC3E}">
+        <p14:creationId xmlns:p14="http://schemas.microsoft.com/office/powerpoint/2010/main" val="4166930"/>
+      </p:ext>
+    </p:extLst>
+  </p:cSld>
+  <p:clrMapOvr>
+    <a:masterClrMapping/>
+  </p:clrMapOvr>
+</p:sld>
+</file>
+
+<file path=ppt/slides/slide4.xml><?xml version="1.0" encoding="utf-8"?>
+<p:sld xmlns:a="http://schemas.openxmlformats.org/drawingml/2006/main" xmlns:r="http://schemas.openxmlformats.org/officeDocument/2006/relationships" xmlns:p="http://schemas.openxmlformats.org/presentationml/2006/main">
+  <p:cSld>
+    <p:spTree>
+      <p:nvGrpSpPr>
+        <p:cNvPr id="1" name=""/>
+        <p:cNvGrpSpPr/>
+        <p:nvPr/>
+      </p:nvGrpSpPr>
+      <p:grpSpPr>
+        <a:xfrm>
+          <a:off x="0" y="0"/>
+          <a:ext cx="0" cy="0"/>
+          <a:chOff x="0" y="0"/>
+          <a:chExt cx="0" cy="0"/>
+        </a:xfrm>
+      </p:grpSpPr>
+      <p:sp>
+        <p:nvSpPr>
+          <p:cNvPr id="2" name="文本占位符 1">
+            <a:extLst>
+              <a:ext uri="{FF2B5EF4-FFF2-40B4-BE49-F238E27FC236}">
+                <a16:creationId xmlns:a16="http://schemas.microsoft.com/office/drawing/2014/main" id="{B591D6D8-51C1-5384-080E-522D7BF064B4}"/>
+              </a:ext>
+            </a:extLst>
+          </p:cNvPr>
+          <p:cNvSpPr>
+            <a:spLocks noGrp="1"/>
+          </p:cNvSpPr>
+          <p:nvPr>
+            <p:ph type="body" sz="quarter" idx="13"/>
+          </p:nvPr>
+        </p:nvSpPr>
+        <p:spPr/>
+        <p:txBody>
+          <a:bodyPr/>
+          <a:lstStyle/>
+          <a:p>
+            <a:r>
+              <a:rPr lang="zh-CN" altLang="en-US" dirty="0"/>
+              <a:t>仅输入汉语拼音：</a:t>
+            </a:r>
+            <a:r>
+              <a:rPr lang="en-US" altLang="zh-CN" dirty="0"/>
+              <a:t>uuzm</a:t>
+            </a:r>
+            <a:endParaRPr lang="en-US" dirty="0"/>
+          </a:p>
+        </p:txBody>
+      </p:sp>
+      <p:sp>
+        <p:nvSpPr>
+          <p:cNvPr id="3" name="标题 2">
+            <a:extLst>
+              <a:ext uri="{FF2B5EF4-FFF2-40B4-BE49-F238E27FC236}">
+                <a16:creationId xmlns:a16="http://schemas.microsoft.com/office/drawing/2014/main" id="{7034A1EE-93A6-1E7B-8BE9-1FDD59EE4D0B}"/>
+              </a:ext>
+            </a:extLst>
+          </p:cNvPr>
+          <p:cNvSpPr>
+            <a:spLocks noGrp="1"/>
+          </p:cNvSpPr>
+          <p:nvPr>
+            <p:ph type="title"/>
+          </p:nvPr>
+        </p:nvSpPr>
+        <p:spPr/>
+        <p:txBody>
+          <a:bodyPr/>
+          <a:lstStyle/>
+          <a:p>
+            <a:r>
+              <a:rPr lang="zh-CN" altLang="en-US" dirty="0"/>
+              <a:t>如何输入汉语拼音</a:t>
+            </a:r>
+            <a:endParaRPr lang="en-US" dirty="0"/>
+          </a:p>
+        </p:txBody>
+      </p:sp>
+      <p:sp>
+        <p:nvSpPr>
+          <p:cNvPr id="4" name="文本占位符 3">
+            <a:extLst>
+              <a:ext uri="{FF2B5EF4-FFF2-40B4-BE49-F238E27FC236}">
+                <a16:creationId xmlns:a16="http://schemas.microsoft.com/office/drawing/2014/main" id="{69A7528D-5319-685C-363F-8711CFAFA5CA}"/>
+              </a:ext>
+            </a:extLst>
+          </p:cNvPr>
+          <p:cNvSpPr>
+            <a:spLocks noGrp="1"/>
+          </p:cNvSpPr>
+          <p:nvPr>
+            <p:ph type="body" sz="quarter" idx="14"/>
+          </p:nvPr>
+        </p:nvSpPr>
+        <p:spPr/>
+        <p:txBody>
+          <a:bodyPr/>
+          <a:lstStyle/>
+          <a:p>
+            <a:r>
+              <a:rPr lang="en-US" altLang="zh-CN" dirty="0"/>
+              <a:t>Word</a:t>
+            </a:r>
+            <a:r>
+              <a:rPr lang="zh-CN" altLang="en-US" dirty="0"/>
+              <a:t>中在汉字上方加上拼音</a:t>
+            </a:r>
+            <a:endParaRPr lang="en-US" dirty="0"/>
+          </a:p>
+        </p:txBody>
+      </p:sp>
+      <p:sp>
+        <p:nvSpPr>
+          <p:cNvPr id="7" name="文本占位符 3">
+            <a:extLst>
+              <a:ext uri="{FF2B5EF4-FFF2-40B4-BE49-F238E27FC236}">
+                <a16:creationId xmlns:a16="http://schemas.microsoft.com/office/drawing/2014/main" id="{B2D597DE-BA1C-65A5-415F-4E666BF55C25}"/>
+              </a:ext>
+            </a:extLst>
+          </p:cNvPr>
+          <p:cNvSpPr txBox="1">
+            <a:spLocks/>
+          </p:cNvSpPr>
+          <p:nvPr/>
+        </p:nvSpPr>
+        <p:spPr>
+          <a:xfrm>
+            <a:off x="1860548" y="3987398"/>
+            <a:ext cx="4433401" cy="823913"/>
+          </a:xfrm>
+          <a:prstGeom prst="rect">
+            <a:avLst/>
+          </a:prstGeom>
+        </p:spPr>
+        <p:txBody>
+          <a:bodyPr vert="horz" lIns="91440" tIns="45720" rIns="91440" bIns="45720" rtlCol="0" anchor="ctr" anchorCtr="0">
+            <a:normAutofit/>
+          </a:bodyPr>
+          <a:lstStyle>
+            <a:lvl1pPr marL="228600" indent="-228600" algn="l" defTabSz="914400" rtl="0" eaLnBrk="1" latinLnBrk="0" hangingPunct="1">
+              <a:lnSpc>
+                <a:spcPct val="90000"/>
+              </a:lnSpc>
+              <a:spcBef>
+                <a:spcPts val="1000"/>
+              </a:spcBef>
+              <a:buFont typeface="Arial" panose="020B0604020202020204" pitchFamily="34" charset="0"/>
+              <a:buChar char="•"/>
+              <a:defRPr sz="2400" kern="1200">
+                <a:solidFill>
+                  <a:schemeClr val="tx1"/>
+                </a:solidFill>
+                <a:latin typeface="+mn-lt"/>
+                <a:ea typeface="+mn-ea"/>
+                <a:cs typeface="+mn-cs"/>
+              </a:defRPr>
+            </a:lvl1pPr>
+            <a:lvl2pPr marL="685800" indent="-228600" algn="l" defTabSz="914400" rtl="0" eaLnBrk="1" latinLnBrk="0" hangingPunct="1">
+              <a:lnSpc>
+                <a:spcPct val="90000"/>
+              </a:lnSpc>
+              <a:spcBef>
+                <a:spcPts val="500"/>
+              </a:spcBef>
+              <a:buFont typeface="Arial" panose="020B0604020202020204" pitchFamily="34" charset="0"/>
+              <a:buChar char="•"/>
+              <a:defRPr sz="2000" kern="1200">
+                <a:solidFill>
+                  <a:schemeClr val="tx1"/>
+                </a:solidFill>
+                <a:latin typeface="+mn-lt"/>
+                <a:ea typeface="+mn-ea"/>
+                <a:cs typeface="+mn-cs"/>
+              </a:defRPr>
+            </a:lvl2pPr>
+            <a:lvl3pPr marL="1143000" indent="-228600" algn="l" defTabSz="914400" rtl="0" eaLnBrk="1" latinLnBrk="0" hangingPunct="1">
+              <a:lnSpc>
+                <a:spcPct val="90000"/>
+              </a:lnSpc>
+              <a:spcBef>
+                <a:spcPts val="500"/>
+              </a:spcBef>
+              <a:buFont typeface="Arial" panose="020B0604020202020204" pitchFamily="34" charset="0"/>
+              <a:buChar char="•"/>
+              <a:defRPr sz="1800" kern="1200">
+                <a:solidFill>
+                  <a:schemeClr val="tx1"/>
+                </a:solidFill>
+                <a:latin typeface="+mn-lt"/>
+                <a:ea typeface="+mn-ea"/>
+                <a:cs typeface="+mn-cs"/>
+              </a:defRPr>
+            </a:lvl3pPr>
+            <a:lvl4pPr marL="1600200" indent="-228600" algn="l" defTabSz="914400" rtl="0" eaLnBrk="1" latinLnBrk="0" hangingPunct="1">
+              <a:lnSpc>
+                <a:spcPct val="90000"/>
+              </a:lnSpc>
+              <a:spcBef>
+                <a:spcPts val="500"/>
+              </a:spcBef>
+              <a:buFont typeface="Arial" panose="020B0604020202020204" pitchFamily="34" charset="0"/>
+              <a:buChar char="•"/>
+              <a:defRPr sz="1600" kern="1200">
+                <a:solidFill>
+                  <a:schemeClr val="tx1"/>
+                </a:solidFill>
+                <a:latin typeface="+mn-lt"/>
+                <a:ea typeface="+mn-ea"/>
+                <a:cs typeface="+mn-cs"/>
+              </a:defRPr>
+            </a:lvl4pPr>
+            <a:lvl5pPr marL="2057400" indent="-228600" algn="l" defTabSz="914400" rtl="0" eaLnBrk="1" latinLnBrk="0" hangingPunct="1">
+              <a:lnSpc>
+                <a:spcPct val="90000"/>
+              </a:lnSpc>
+              <a:spcBef>
+                <a:spcPts val="500"/>
+              </a:spcBef>
+              <a:buFont typeface="Arial" panose="020B0604020202020204" pitchFamily="34" charset="0"/>
+              <a:buChar char="•"/>
+              <a:defRPr sz="1600" kern="1200">
+                <a:solidFill>
+                  <a:schemeClr val="tx1"/>
+                </a:solidFill>
+                <a:latin typeface="+mn-lt"/>
+                <a:ea typeface="+mn-ea"/>
+                <a:cs typeface="+mn-cs"/>
+              </a:defRPr>
+            </a:lvl5pPr>
+            <a:lvl6pPr marL="2514600" indent="-228600" algn="l" defTabSz="914400" rtl="0" eaLnBrk="1" latinLnBrk="0" hangingPunct="1">
+              <a:lnSpc>
+                <a:spcPct val="90000"/>
+              </a:lnSpc>
+              <a:spcBef>
+                <a:spcPts val="500"/>
+              </a:spcBef>
+              <a:buFont typeface="Arial" panose="020B0604020202020204" pitchFamily="34" charset="0"/>
+              <a:buChar char="•"/>
+              <a:defRPr sz="1400" kern="1200">
+                <a:solidFill>
+                  <a:schemeClr val="tx1"/>
+                </a:solidFill>
+                <a:latin typeface="+mn-lt"/>
+                <a:ea typeface="+mn-ea"/>
+                <a:cs typeface="+mn-cs"/>
+              </a:defRPr>
+            </a:lvl6pPr>
+            <a:lvl7pPr marL="2971800" indent="-228600" algn="l" defTabSz="914400" rtl="0" eaLnBrk="1" latinLnBrk="0" hangingPunct="1">
+              <a:lnSpc>
+                <a:spcPct val="90000"/>
+              </a:lnSpc>
+              <a:spcBef>
+                <a:spcPts val="500"/>
+              </a:spcBef>
+              <a:buFont typeface="Arial" panose="020B0604020202020204" pitchFamily="34" charset="0"/>
+              <a:buChar char="•"/>
+              <a:defRPr sz="1400" kern="1200">
+                <a:solidFill>
+                  <a:schemeClr val="tx1"/>
+                </a:solidFill>
+                <a:latin typeface="+mn-lt"/>
+                <a:ea typeface="+mn-ea"/>
+                <a:cs typeface="+mn-cs"/>
+              </a:defRPr>
+            </a:lvl7pPr>
+            <a:lvl8pPr marL="3429000" indent="-228600" algn="l" defTabSz="914400" rtl="0" eaLnBrk="1" latinLnBrk="0" hangingPunct="1">
+              <a:lnSpc>
+                <a:spcPct val="90000"/>
+              </a:lnSpc>
+              <a:spcBef>
+                <a:spcPts val="500"/>
+              </a:spcBef>
+              <a:buFont typeface="Arial" panose="020B0604020202020204" pitchFamily="34" charset="0"/>
+              <a:buChar char="•"/>
+              <a:defRPr sz="1400" kern="1200">
+                <a:solidFill>
+                  <a:schemeClr val="tx1"/>
+                </a:solidFill>
+                <a:latin typeface="+mn-lt"/>
+                <a:ea typeface="+mn-ea"/>
+                <a:cs typeface="+mn-cs"/>
+              </a:defRPr>
+            </a:lvl8pPr>
+            <a:lvl9pPr marL="3886200" indent="-228600" algn="l" defTabSz="914400" rtl="0" eaLnBrk="1" latinLnBrk="0" hangingPunct="1">
+              <a:lnSpc>
+                <a:spcPct val="90000"/>
+              </a:lnSpc>
+              <a:spcBef>
+                <a:spcPts val="500"/>
+              </a:spcBef>
+              <a:buFont typeface="Arial" panose="020B0604020202020204" pitchFamily="34" charset="0"/>
+              <a:buChar char="•"/>
+              <a:defRPr sz="1400" kern="1200">
+                <a:solidFill>
+                  <a:schemeClr val="tx1"/>
+                </a:solidFill>
+                <a:latin typeface="+mn-lt"/>
+                <a:ea typeface="+mn-ea"/>
+                <a:cs typeface="+mn-cs"/>
+              </a:defRPr>
+            </a:lvl9pPr>
+          </a:lstStyle>
+          <a:p>
+            <a:r>
+              <a:rPr lang="en-US" altLang="zh-CN" dirty="0"/>
+              <a:t>PPT</a:t>
+            </a:r>
+            <a:r>
+              <a:rPr lang="zh-CN" altLang="en-US" dirty="0"/>
+              <a:t>中加拼音</a:t>
+            </a:r>
+            <a:endParaRPr lang="en-US" dirty="0"/>
+          </a:p>
+        </p:txBody>
+      </p:sp>
+    </p:spTree>
+    <p:extLst>
+      <p:ext uri="{BB962C8B-B14F-4D97-AF65-F5344CB8AC3E}">
+        <p14:creationId xmlns:p14="http://schemas.microsoft.com/office/powerpoint/2010/main" val="2477380262"/>
       </p:ext>
     </p:extLst>
   </p:cSld>

</xml_diff>